<commit_message>
ppt file update and images
</commit_message>
<xml_diff>
--- a/Movie Guru.pptx
+++ b/Movie Guru.pptx
@@ -110,6 +110,11 @@
       </a:defRPr>
     </a:lvl9pPr>
   </p:defaultTextStyle>
+  <p:extLst>
+    <p:ext uri="{EFAFB233-063F-42B5-8137-9DF3F51BA10A}">
+      <p15:sldGuideLst xmlns:p15="http://schemas.microsoft.com/office/powerpoint/2012/main"/>
+    </p:ext>
+  </p:extLst>
 </p:presentation>
 </file>
 
@@ -377,7 +382,7 @@
           <a:p>
             <a:fld id="{ED291B17-9318-49DB-B28B-6E5994AE9581}" type="datetime1">
               <a:rPr lang="en-US" smtClean="0"/>
-              <a:t>8/15/2021</a:t>
+              <a:t>8/15/21</a:t>
             </a:fld>
             <a:endParaRPr lang="en-US" dirty="0"/>
           </a:p>
@@ -580,7 +585,7 @@
           <a:p>
             <a:fld id="{2CED4963-E985-44C4-B8C4-FDD613B7C2F8}" type="datetime1">
               <a:rPr lang="en-US" smtClean="0"/>
-              <a:t>8/15/2021</a:t>
+              <a:t>8/15/21</a:t>
             </a:fld>
             <a:endParaRPr lang="en-US" dirty="0"/>
           </a:p>
@@ -942,7 +947,7 @@
           <a:p>
             <a:fld id="{ED291B17-9318-49DB-B28B-6E5994AE9581}" type="datetime1">
               <a:rPr lang="en-US" smtClean="0"/>
-              <a:t>8/15/2021</a:t>
+              <a:t>8/15/21</a:t>
             </a:fld>
             <a:endParaRPr lang="en-US" dirty="0"/>
           </a:p>
@@ -1140,7 +1145,7 @@
           <a:p>
             <a:fld id="{78DD82B9-B8EE-4375-B6FF-88FA6ABB15D9}" type="datetime1">
               <a:rPr lang="en-US" smtClean="0"/>
-              <a:t>8/15/2021</a:t>
+              <a:t>8/15/21</a:t>
             </a:fld>
             <a:endParaRPr lang="en-US" dirty="0"/>
           </a:p>
@@ -1452,7 +1457,7 @@
           <a:p>
             <a:fld id="{B2497495-0637-405E-AE64-5CC7506D51F5}" type="datetime1">
               <a:rPr lang="en-US" smtClean="0"/>
-              <a:t>8/15/2021</a:t>
+              <a:t>8/15/21</a:t>
             </a:fld>
             <a:endParaRPr lang="en-US" dirty="0"/>
           </a:p>
@@ -1705,7 +1710,7 @@
           <a:p>
             <a:fld id="{7BFFD690-9426-415D-8B65-26881E07B2D4}" type="datetime1">
               <a:rPr lang="en-US" smtClean="0"/>
-              <a:t>8/15/2021</a:t>
+              <a:t>8/15/21</a:t>
             </a:fld>
             <a:endParaRPr lang="en-US" dirty="0"/>
           </a:p>
@@ -2127,7 +2132,7 @@
           <a:p>
             <a:fld id="{04C4989A-474C-40DE-95B9-011C28B71673}" type="datetime1">
               <a:rPr lang="en-US" smtClean="0"/>
-              <a:t>8/15/2021</a:t>
+              <a:t>8/15/21</a:t>
             </a:fld>
             <a:endParaRPr lang="en-US" dirty="0"/>
           </a:p>
@@ -2250,7 +2255,7 @@
           <a:p>
             <a:fld id="{5DB4ED54-5B5E-4A04-93D3-5772E3CE3818}" type="datetime1">
               <a:rPr lang="en-US" smtClean="0"/>
-              <a:t>8/15/2021</a:t>
+              <a:t>8/15/21</a:t>
             </a:fld>
             <a:endParaRPr lang="en-US" dirty="0"/>
           </a:p>
@@ -2345,7 +2350,7 @@
           <a:p>
             <a:fld id="{4EDE50D6-574B-40AF-946F-D52A04ADE379}" type="datetime1">
               <a:rPr lang="en-US" smtClean="0"/>
-              <a:t>8/15/2021</a:t>
+              <a:t>8/15/21</a:t>
             </a:fld>
             <a:endParaRPr lang="en-US" dirty="0"/>
           </a:p>
@@ -2722,7 +2727,7 @@
           <a:p>
             <a:fld id="{D82884F1-FFEA-405F-9602-3DCA865EDA4E}" type="datetime1">
               <a:rPr lang="en-US" smtClean="0"/>
-              <a:t>8/15/2021</a:t>
+              <a:t>8/15/21</a:t>
             </a:fld>
             <a:endParaRPr lang="en-US" dirty="0"/>
           </a:p>
@@ -3015,7 +3020,7 @@
           <a:p>
             <a:fld id="{7E18DB4A-8810-4A10-AD5C-D5E2C667F5B3}" type="datetime1">
               <a:rPr lang="en-US" smtClean="0"/>
-              <a:t>8/15/2021</a:t>
+              <a:t>8/15/21</a:t>
             </a:fld>
             <a:endParaRPr lang="en-US" dirty="0"/>
           </a:p>
@@ -3230,7 +3235,7 @@
           <a:p>
             <a:fld id="{ED291B17-9318-49DB-B28B-6E5994AE9581}" type="datetime1">
               <a:rPr lang="en-US" smtClean="0"/>
-              <a:t>8/15/2021</a:t>
+              <a:t>8/15/21</a:t>
             </a:fld>
             <a:endParaRPr lang="en-US" dirty="0"/>
           </a:p>
@@ -5224,28 +5229,278 @@
           </a:p>
         </p:txBody>
       </p:sp>
-      <p:sp>
-        <p:nvSpPr>
-          <p:cNvPr id="3" name="Content Placeholder 2">
+      <p:pic>
+        <p:nvPicPr>
+          <p:cNvPr id="5" name="Picture 4" descr="Map&#10;&#10;Description automatically generated">
             <a:extLst>
               <a:ext uri="{FF2B5EF4-FFF2-40B4-BE49-F238E27FC236}">
-                <a16:creationId xmlns:a16="http://schemas.microsoft.com/office/drawing/2014/main" id="{48225727-EF47-4580-97E8-D83B2576A144}"/>
+                <a16:creationId xmlns:a16="http://schemas.microsoft.com/office/drawing/2014/main" id="{57F4F377-7E88-4542-BAAE-54E87E6D24C3}"/>
               </a:ext>
             </a:extLst>
           </p:cNvPr>
-          <p:cNvSpPr>
-            <a:spLocks noGrp="1"/>
-          </p:cNvSpPr>
-          <p:nvPr>
-            <p:ph idx="1"/>
-          </p:nvPr>
-        </p:nvSpPr>
-        <p:spPr/>
-        <p:txBody>
-          <a:bodyPr/>
-          <a:lstStyle/>
-          <a:p>
-            <a:endParaRPr lang="en-US"/>
+          <p:cNvPicPr>
+            <a:picLocks noChangeAspect="1"/>
+          </p:cNvPicPr>
+          <p:nvPr/>
+        </p:nvPicPr>
+        <p:blipFill>
+          <a:blip r:embed="rId2">
+            <a:extLst>
+              <a:ext uri="{28A0092B-C50C-407E-A947-70E740481C1C}">
+                <a14:useLocalDpi xmlns:a14="http://schemas.microsoft.com/office/drawing/2010/main" val="0"/>
+              </a:ext>
+            </a:extLst>
+          </a:blip>
+          <a:stretch>
+            <a:fillRect/>
+          </a:stretch>
+        </p:blipFill>
+        <p:spPr>
+          <a:xfrm>
+            <a:off x="460862" y="2191960"/>
+            <a:ext cx="5804766" cy="3261970"/>
+          </a:xfrm>
+          <a:prstGeom prst="rect">
+            <a:avLst/>
+          </a:prstGeom>
+        </p:spPr>
+      </p:pic>
+      <p:sp>
+        <p:nvSpPr>
+          <p:cNvPr id="6" name="TextBox 5">
+            <a:extLst>
+              <a:ext uri="{FF2B5EF4-FFF2-40B4-BE49-F238E27FC236}">
+                <a16:creationId xmlns:a16="http://schemas.microsoft.com/office/drawing/2014/main" id="{5E9AD564-7C4C-4142-85EF-D5239E203D33}"/>
+              </a:ext>
+            </a:extLst>
+          </p:cNvPr>
+          <p:cNvSpPr txBox="1"/>
+          <p:nvPr/>
+        </p:nvSpPr>
+        <p:spPr>
+          <a:xfrm>
+            <a:off x="-93211" y="5587372"/>
+            <a:ext cx="6425895" cy="769441"/>
+          </a:xfrm>
+          <a:prstGeom prst="rect">
+            <a:avLst/>
+          </a:prstGeom>
+          <a:noFill/>
+        </p:spPr>
+        <p:txBody>
+          <a:bodyPr wrap="square" rtlCol="0">
+            <a:spAutoFit/>
+          </a:bodyPr>
+          <a:lstStyle/>
+          <a:p>
+            <a:pPr algn="ctr"/>
+            <a:r>
+              <a:rPr lang="en-US" sz="1600" dirty="0"/>
+              <a:t>Leaflet Map showing movies produced in each country</a:t>
+            </a:r>
+          </a:p>
+          <a:p>
+            <a:pPr algn="ctr"/>
+            <a:r>
+              <a:rPr lang="en-US" sz="1600" b="1" dirty="0"/>
+              <a:t>USA &gt; India &gt; Japan &gt; France &gt; Italy</a:t>
+            </a:r>
+          </a:p>
+          <a:p>
+            <a:pPr algn="ctr"/>
+            <a:r>
+              <a:rPr lang="en-US" sz="1200" dirty="0"/>
+              <a:t>Flask </a:t>
+            </a:r>
+            <a:r>
+              <a:rPr lang="en-US" sz="1200" dirty="0" err="1"/>
+              <a:t>api</a:t>
+            </a:r>
+            <a:r>
+              <a:rPr lang="en-US" sz="1200" dirty="0"/>
+              <a:t> route (“/”) to render data on landing page</a:t>
+            </a:r>
+          </a:p>
+        </p:txBody>
+      </p:sp>
+      <p:pic>
+        <p:nvPicPr>
+          <p:cNvPr id="8" name="Picture 7" descr="A picture containing text, computer, screenshot&#10;&#10;Description automatically generated">
+            <a:extLst>
+              <a:ext uri="{FF2B5EF4-FFF2-40B4-BE49-F238E27FC236}">
+                <a16:creationId xmlns:a16="http://schemas.microsoft.com/office/drawing/2014/main" id="{C25BA123-A231-4143-ACE2-20D1B18DA601}"/>
+              </a:ext>
+            </a:extLst>
+          </p:cNvPr>
+          <p:cNvPicPr>
+            <a:picLocks noChangeAspect="1"/>
+          </p:cNvPicPr>
+          <p:nvPr/>
+        </p:nvPicPr>
+        <p:blipFill rotWithShape="1">
+          <a:blip r:embed="rId3">
+            <a:extLst>
+              <a:ext uri="{28A0092B-C50C-407E-A947-70E740481C1C}">
+                <a14:useLocalDpi xmlns:a14="http://schemas.microsoft.com/office/drawing/2010/main" val="0"/>
+              </a:ext>
+            </a:extLst>
+          </a:blip>
+          <a:srcRect l="12637" t="13071" r="9411" b="3651"/>
+          <a:stretch/>
+        </p:blipFill>
+        <p:spPr>
+          <a:xfrm>
+            <a:off x="7173269" y="733150"/>
+            <a:ext cx="3819409" cy="2295185"/>
+          </a:xfrm>
+          <a:prstGeom prst="rect">
+            <a:avLst/>
+          </a:prstGeom>
+        </p:spPr>
+      </p:pic>
+      <p:sp>
+        <p:nvSpPr>
+          <p:cNvPr id="9" name="TextBox 8">
+            <a:extLst>
+              <a:ext uri="{FF2B5EF4-FFF2-40B4-BE49-F238E27FC236}">
+                <a16:creationId xmlns:a16="http://schemas.microsoft.com/office/drawing/2014/main" id="{03FE3EDD-8B34-4845-854A-9845E9CB2712}"/>
+              </a:ext>
+            </a:extLst>
+          </p:cNvPr>
+          <p:cNvSpPr txBox="1"/>
+          <p:nvPr/>
+        </p:nvSpPr>
+        <p:spPr>
+          <a:xfrm>
+            <a:off x="6712087" y="3028335"/>
+            <a:ext cx="5164240" cy="577081"/>
+          </a:xfrm>
+          <a:prstGeom prst="rect">
+            <a:avLst/>
+          </a:prstGeom>
+          <a:noFill/>
+        </p:spPr>
+        <p:txBody>
+          <a:bodyPr wrap="square" rtlCol="0">
+            <a:spAutoFit/>
+          </a:bodyPr>
+          <a:lstStyle/>
+          <a:p>
+            <a:pPr algn="ctr"/>
+            <a:r>
+              <a:rPr lang="en-US" sz="1050" dirty="0"/>
+              <a:t>Average rating for genre selected in dropdown for each country</a:t>
+            </a:r>
+          </a:p>
+          <a:p>
+            <a:pPr algn="ctr"/>
+            <a:r>
+              <a:rPr lang="en-US" sz="1050" b="1" dirty="0"/>
+              <a:t>ChartJS is a new library not covered in the class</a:t>
+            </a:r>
+          </a:p>
+          <a:p>
+            <a:pPr algn="ctr"/>
+            <a:r>
+              <a:rPr lang="en-US" sz="1050" i="1" dirty="0"/>
+              <a:t>Flask </a:t>
+            </a:r>
+            <a:r>
+              <a:rPr lang="en-US" sz="1050" i="1" dirty="0" err="1"/>
+              <a:t>api</a:t>
+            </a:r>
+            <a:r>
+              <a:rPr lang="en-US" sz="1050" i="1" dirty="0"/>
+              <a:t> route (“/&lt;genre_name&gt;”) used to query for the data grouped by country</a:t>
+            </a:r>
+            <a:endParaRPr lang="en-US" sz="900" i="1" dirty="0"/>
+          </a:p>
+        </p:txBody>
+      </p:sp>
+      <p:pic>
+        <p:nvPicPr>
+          <p:cNvPr id="11" name="Picture 10" descr="Chart&#10;&#10;Description automatically generated">
+            <a:extLst>
+              <a:ext uri="{FF2B5EF4-FFF2-40B4-BE49-F238E27FC236}">
+                <a16:creationId xmlns:a16="http://schemas.microsoft.com/office/drawing/2014/main" id="{B0696C56-A33B-A54D-B9F7-64913947242A}"/>
+              </a:ext>
+            </a:extLst>
+          </p:cNvPr>
+          <p:cNvPicPr>
+            <a:picLocks noChangeAspect="1"/>
+          </p:cNvPicPr>
+          <p:nvPr/>
+        </p:nvPicPr>
+        <p:blipFill rotWithShape="1">
+          <a:blip r:embed="rId4">
+            <a:extLst>
+              <a:ext uri="{28A0092B-C50C-407E-A947-70E740481C1C}">
+                <a14:useLocalDpi xmlns:a14="http://schemas.microsoft.com/office/drawing/2010/main" val="0"/>
+              </a:ext>
+            </a:extLst>
+          </a:blip>
+          <a:srcRect l="13206" t="10239" r="10327" b="3188"/>
+          <a:stretch/>
+        </p:blipFill>
+        <p:spPr>
+          <a:xfrm>
+            <a:off x="7145180" y="3822945"/>
+            <a:ext cx="3875585" cy="2468121"/>
+          </a:xfrm>
+          <a:prstGeom prst="rect">
+            <a:avLst/>
+          </a:prstGeom>
+        </p:spPr>
+      </p:pic>
+      <p:sp>
+        <p:nvSpPr>
+          <p:cNvPr id="12" name="TextBox 11">
+            <a:extLst>
+              <a:ext uri="{FF2B5EF4-FFF2-40B4-BE49-F238E27FC236}">
+                <a16:creationId xmlns:a16="http://schemas.microsoft.com/office/drawing/2014/main" id="{BB275CB2-1392-2545-9479-1855236A30D0}"/>
+              </a:ext>
+            </a:extLst>
+          </p:cNvPr>
+          <p:cNvSpPr txBox="1"/>
+          <p:nvPr/>
+        </p:nvSpPr>
+        <p:spPr>
+          <a:xfrm>
+            <a:off x="6861174" y="6243973"/>
+            <a:ext cx="5164240" cy="415498"/>
+          </a:xfrm>
+          <a:prstGeom prst="rect">
+            <a:avLst/>
+          </a:prstGeom>
+          <a:noFill/>
+        </p:spPr>
+        <p:txBody>
+          <a:bodyPr wrap="square" rtlCol="0">
+            <a:spAutoFit/>
+          </a:bodyPr>
+          <a:lstStyle/>
+          <a:p>
+            <a:pPr algn="ctr"/>
+            <a:r>
+              <a:rPr lang="en-US" sz="1050" dirty="0"/>
+              <a:t>Total movies in each genre for country selected in dropdown</a:t>
+            </a:r>
+          </a:p>
+          <a:p>
+            <a:pPr algn="ctr"/>
+            <a:r>
+              <a:rPr lang="en-US" sz="1050" i="1" dirty="0"/>
+              <a:t>Flask </a:t>
+            </a:r>
+            <a:r>
+              <a:rPr lang="en-US" sz="1050" i="1" dirty="0" err="1"/>
+              <a:t>api</a:t>
+            </a:r>
+            <a:r>
+              <a:rPr lang="en-US" sz="1050" i="1" dirty="0"/>
+              <a:t> route (“/country/&lt;name&gt;”) used to query for the data grouped by genre</a:t>
+            </a:r>
+            <a:endParaRPr lang="en-US" sz="900" i="1" dirty="0"/>
           </a:p>
         </p:txBody>
       </p:sp>

</xml_diff>

<commit_message>
modified ETL slide in ppt
</commit_message>
<xml_diff>
--- a/Movie Guru.pptx
+++ b/Movie Guru.pptx
@@ -229,7 +229,7 @@
           <a:p>
             <a:fld id="{54788375-44CB-3247-94CD-E4D1BECA1B3C}" type="datetimeFigureOut">
               <a:rPr lang="en-US" smtClean="0"/>
-              <a:t>8/15/21</a:t>
+              <a:t>8/16/21</a:t>
             </a:fld>
             <a:endParaRPr lang="en-US"/>
           </a:p>
@@ -734,7 +734,7 @@
           <a:p>
             <a:fld id="{B8A68F0B-36EA-FD48-9365-71FE7D543ED4}" type="datetime1">
               <a:rPr lang="en-US" smtClean="0"/>
-              <a:t>8/15/21</a:t>
+              <a:t>8/16/21</a:t>
             </a:fld>
             <a:endParaRPr lang="en-US" dirty="0"/>
           </a:p>
@@ -937,7 +937,7 @@
           <a:p>
             <a:fld id="{3ADDC197-0D0A-6141-9C0D-2832BFC4CE75}" type="datetime1">
               <a:rPr lang="en-US" smtClean="0"/>
-              <a:t>8/15/21</a:t>
+              <a:t>8/16/21</a:t>
             </a:fld>
             <a:endParaRPr lang="en-US" dirty="0"/>
           </a:p>
@@ -1299,7 +1299,7 @@
           <a:p>
             <a:fld id="{1FF09437-95FF-A344-BCBF-97C2CBF55DD8}" type="datetime1">
               <a:rPr lang="en-US" smtClean="0"/>
-              <a:t>8/15/21</a:t>
+              <a:t>8/16/21</a:t>
             </a:fld>
             <a:endParaRPr lang="en-US" dirty="0"/>
           </a:p>
@@ -1497,7 +1497,7 @@
           <a:p>
             <a:fld id="{D0AACD92-0C01-C54C-BEBE-55D5EF77E415}" type="datetime1">
               <a:rPr lang="en-US" smtClean="0"/>
-              <a:t>8/15/21</a:t>
+              <a:t>8/16/21</a:t>
             </a:fld>
             <a:endParaRPr lang="en-US" dirty="0"/>
           </a:p>
@@ -1809,7 +1809,7 @@
           <a:p>
             <a:fld id="{AE46252E-03D4-A240-BABE-992977EBDEE5}" type="datetime1">
               <a:rPr lang="en-US" smtClean="0"/>
-              <a:t>8/15/21</a:t>
+              <a:t>8/16/21</a:t>
             </a:fld>
             <a:endParaRPr lang="en-US" dirty="0"/>
           </a:p>
@@ -2062,7 +2062,7 @@
           <a:p>
             <a:fld id="{E9B0B173-CDDA-5E45-96EC-1E6F9E7EDFCE}" type="datetime1">
               <a:rPr lang="en-US" smtClean="0"/>
-              <a:t>8/15/21</a:t>
+              <a:t>8/16/21</a:t>
             </a:fld>
             <a:endParaRPr lang="en-US" dirty="0"/>
           </a:p>
@@ -2484,7 +2484,7 @@
           <a:p>
             <a:fld id="{BA22CF18-F4F3-844E-B7C6-F0D68CFCB572}" type="datetime1">
               <a:rPr lang="en-US" smtClean="0"/>
-              <a:t>8/15/21</a:t>
+              <a:t>8/16/21</a:t>
             </a:fld>
             <a:endParaRPr lang="en-US" dirty="0"/>
           </a:p>
@@ -2607,7 +2607,7 @@
           <a:p>
             <a:fld id="{184ECDD8-5E36-3B41-BAD7-75AFBE24C7F3}" type="datetime1">
               <a:rPr lang="en-US" smtClean="0"/>
-              <a:t>8/15/21</a:t>
+              <a:t>8/16/21</a:t>
             </a:fld>
             <a:endParaRPr lang="en-US" dirty="0"/>
           </a:p>
@@ -2702,7 +2702,7 @@
           <a:p>
             <a:fld id="{C8464CC7-4F19-6E4E-8E9F-CCA24A933952}" type="datetime1">
               <a:rPr lang="en-US" smtClean="0"/>
-              <a:t>8/15/21</a:t>
+              <a:t>8/16/21</a:t>
             </a:fld>
             <a:endParaRPr lang="en-US" dirty="0"/>
           </a:p>
@@ -3079,7 +3079,7 @@
           <a:p>
             <a:fld id="{E9E4DCBF-5D42-F644-83DA-195215DCFF73}" type="datetime1">
               <a:rPr lang="en-US" smtClean="0"/>
-              <a:t>8/15/21</a:t>
+              <a:t>8/16/21</a:t>
             </a:fld>
             <a:endParaRPr lang="en-US" dirty="0"/>
           </a:p>
@@ -3372,7 +3372,7 @@
           <a:p>
             <a:fld id="{7754AB9F-2145-2643-876A-49E5A01B301E}" type="datetime1">
               <a:rPr lang="en-US" smtClean="0"/>
-              <a:t>8/15/21</a:t>
+              <a:t>8/16/21</a:t>
             </a:fld>
             <a:endParaRPr lang="en-US" dirty="0"/>
           </a:p>
@@ -3587,7 +3587,7 @@
           <a:p>
             <a:fld id="{C67DA9E9-774E-F64F-9167-10EBDCB4CAE4}" type="datetime1">
               <a:rPr lang="en-US" smtClean="0"/>
-              <a:t>8/15/21</a:t>
+              <a:t>8/16/21</a:t>
             </a:fld>
             <a:endParaRPr lang="en-US" dirty="0"/>
           </a:p>
@@ -5218,7 +5218,7 @@
             </a:pPr>
             <a:r>
               <a:rPr lang="en-US" sz="1800" dirty="0"/>
-              <a:t>Import data to Jupyter notebook</a:t>
+              <a:t>Import .csv data to Jupyter notebook</a:t>
             </a:r>
           </a:p>
           <a:p>
@@ -5231,7 +5231,31 @@
             </a:pPr>
             <a:r>
               <a:rPr lang="en-US" sz="1800" dirty="0"/>
-              <a:t>Merging different DB’s such IMDB films data with Latitude and Longitude of different countries. </a:t>
+              <a:t>Merged the IMDB </a:t>
+            </a:r>
+            <a:r>
+              <a:rPr lang="en-US" dirty="0"/>
+              <a:t>F</a:t>
+            </a:r>
+            <a:r>
+              <a:rPr lang="en-US" sz="1800" dirty="0"/>
+              <a:t>ilms </a:t>
+            </a:r>
+            <a:r>
+              <a:rPr lang="en-US" sz="1800" dirty="0" err="1"/>
+              <a:t>dataframe</a:t>
+            </a:r>
+            <a:r>
+              <a:rPr lang="en-US" sz="1800" dirty="0"/>
+              <a:t> with the Latitude and Longitude </a:t>
+            </a:r>
+            <a:r>
+              <a:rPr lang="en-US" sz="1800" dirty="0" err="1"/>
+              <a:t>dataframe</a:t>
+            </a:r>
+            <a:r>
+              <a:rPr lang="en-US" sz="1800" dirty="0"/>
+              <a:t>. </a:t>
             </a:r>
           </a:p>
           <a:p>
@@ -5244,11 +5268,11 @@
             </a:pPr>
             <a:r>
               <a:rPr lang="en-US" sz="1800" dirty="0"/>
-              <a:t>Drop </a:t>
+              <a:t>Dropped </a:t>
             </a:r>
             <a:r>
               <a:rPr lang="en-US" dirty="0"/>
-              <a:t>columns and finding unique data , splitting cells strings to structure data source.</a:t>
+              <a:t>columns and found unique data; split cells strings to structure data source.</a:t>
             </a:r>
             <a:endParaRPr lang="en-US" sz="1800" dirty="0"/>
           </a:p>
@@ -5270,7 +5294,7 @@
             </a:r>
             <a:r>
               <a:rPr lang="en-US" sz="1800" dirty="0"/>
-              <a:t>ostgreSQL and generate engine</a:t>
+              <a:t>ostgreSQL and generate engine using Pandas </a:t>
             </a:r>
           </a:p>
           <a:p>
@@ -5282,8 +5306,12 @@
               <a:buChar char="-"/>
             </a:pPr>
             <a:r>
+              <a:rPr lang="en-US" sz="1800"/>
+              <a:t>ETL </a:t>
+            </a:r>
+            <a:r>
               <a:rPr lang="en-US" sz="1800" dirty="0"/>
-              <a:t>ETL process complete</a:t>
+              <a:t>process complete</a:t>
             </a:r>
           </a:p>
           <a:p>

</xml_diff>